<commit_message>
Added preview Wireframes... these should be replaced with final versions.
</commit_message>
<xml_diff>
--- a/docs/sprint1Presentation.pptx
+++ b/docs/sprint1Presentation.pptx
@@ -7,12 +7,19 @@
   <p:sldIdLst>
     <p:sldId id="256" r:id="rId2"/>
     <p:sldId id="257" r:id="rId3"/>
-    <p:sldId id="258" r:id="rId4"/>
-    <p:sldId id="259" r:id="rId5"/>
-    <p:sldId id="260" r:id="rId6"/>
-    <p:sldId id="261" r:id="rId7"/>
-    <p:sldId id="262" r:id="rId8"/>
-    <p:sldId id="263" r:id="rId9"/>
+    <p:sldId id="265" r:id="rId4"/>
+    <p:sldId id="258" r:id="rId5"/>
+    <p:sldId id="259" r:id="rId6"/>
+    <p:sldId id="260" r:id="rId7"/>
+    <p:sldId id="266" r:id="rId8"/>
+    <p:sldId id="267" r:id="rId9"/>
+    <p:sldId id="268" r:id="rId10"/>
+    <p:sldId id="269" r:id="rId11"/>
+    <p:sldId id="270" r:id="rId12"/>
+    <p:sldId id="271" r:id="rId13"/>
+    <p:sldId id="261" r:id="rId14"/>
+    <p:sldId id="262" r:id="rId15"/>
+    <p:sldId id="263" r:id="rId16"/>
   </p:sldIdLst>
   <p:sldSz cx="12192000" cy="6858000"/>
   <p:notesSz cx="6858000" cy="9144000"/>
@@ -266,7 +273,7 @@
           <a:p>
             <a:fld id="{1FFBDEF7-6A33-4033-91F9-9A847E381311}" type="datetimeFigureOut">
               <a:rPr lang="en-US" smtClean="0"/>
-              <a:t>3/10/2020</a:t>
+              <a:t>3/12/2020</a:t>
             </a:fld>
             <a:endParaRPr lang="en-US"/>
           </a:p>
@@ -464,7 +471,7 @@
           <a:p>
             <a:fld id="{1FFBDEF7-6A33-4033-91F9-9A847E381311}" type="datetimeFigureOut">
               <a:rPr lang="en-US" smtClean="0"/>
-              <a:t>3/10/2020</a:t>
+              <a:t>3/12/2020</a:t>
             </a:fld>
             <a:endParaRPr lang="en-US"/>
           </a:p>
@@ -672,7 +679,7 @@
           <a:p>
             <a:fld id="{1FFBDEF7-6A33-4033-91F9-9A847E381311}" type="datetimeFigureOut">
               <a:rPr lang="en-US" smtClean="0"/>
-              <a:t>3/10/2020</a:t>
+              <a:t>3/12/2020</a:t>
             </a:fld>
             <a:endParaRPr lang="en-US"/>
           </a:p>
@@ -870,7 +877,7 @@
           <a:p>
             <a:fld id="{1FFBDEF7-6A33-4033-91F9-9A847E381311}" type="datetimeFigureOut">
               <a:rPr lang="en-US" smtClean="0"/>
-              <a:t>3/10/2020</a:t>
+              <a:t>3/12/2020</a:t>
             </a:fld>
             <a:endParaRPr lang="en-US"/>
           </a:p>
@@ -1145,7 +1152,7 @@
           <a:p>
             <a:fld id="{1FFBDEF7-6A33-4033-91F9-9A847E381311}" type="datetimeFigureOut">
               <a:rPr lang="en-US" smtClean="0"/>
-              <a:t>3/10/2020</a:t>
+              <a:t>3/12/2020</a:t>
             </a:fld>
             <a:endParaRPr lang="en-US"/>
           </a:p>
@@ -1410,7 +1417,7 @@
           <a:p>
             <a:fld id="{1FFBDEF7-6A33-4033-91F9-9A847E381311}" type="datetimeFigureOut">
               <a:rPr lang="en-US" smtClean="0"/>
-              <a:t>3/10/2020</a:t>
+              <a:t>3/12/2020</a:t>
             </a:fld>
             <a:endParaRPr lang="en-US"/>
           </a:p>
@@ -1822,7 +1829,7 @@
           <a:p>
             <a:fld id="{1FFBDEF7-6A33-4033-91F9-9A847E381311}" type="datetimeFigureOut">
               <a:rPr lang="en-US" smtClean="0"/>
-              <a:t>3/10/2020</a:t>
+              <a:t>3/12/2020</a:t>
             </a:fld>
             <a:endParaRPr lang="en-US"/>
           </a:p>
@@ -1963,7 +1970,7 @@
           <a:p>
             <a:fld id="{1FFBDEF7-6A33-4033-91F9-9A847E381311}" type="datetimeFigureOut">
               <a:rPr lang="en-US" smtClean="0"/>
-              <a:t>3/10/2020</a:t>
+              <a:t>3/12/2020</a:t>
             </a:fld>
             <a:endParaRPr lang="en-US"/>
           </a:p>
@@ -2076,7 +2083,7 @@
           <a:p>
             <a:fld id="{1FFBDEF7-6A33-4033-91F9-9A847E381311}" type="datetimeFigureOut">
               <a:rPr lang="en-US" smtClean="0"/>
-              <a:t>3/10/2020</a:t>
+              <a:t>3/12/2020</a:t>
             </a:fld>
             <a:endParaRPr lang="en-US"/>
           </a:p>
@@ -2387,7 +2394,7 @@
           <a:p>
             <a:fld id="{1FFBDEF7-6A33-4033-91F9-9A847E381311}" type="datetimeFigureOut">
               <a:rPr lang="en-US" smtClean="0"/>
-              <a:t>3/10/2020</a:t>
+              <a:t>3/12/2020</a:t>
             </a:fld>
             <a:endParaRPr lang="en-US"/>
           </a:p>
@@ -2675,7 +2682,7 @@
           <a:p>
             <a:fld id="{1FFBDEF7-6A33-4033-91F9-9A847E381311}" type="datetimeFigureOut">
               <a:rPr lang="en-US" smtClean="0"/>
-              <a:t>3/10/2020</a:t>
+              <a:t>3/12/2020</a:t>
             </a:fld>
             <a:endParaRPr lang="en-US"/>
           </a:p>
@@ -2916,7 +2923,7 @@
           <a:p>
             <a:fld id="{1FFBDEF7-6A33-4033-91F9-9A847E381311}" type="datetimeFigureOut">
               <a:rPr lang="en-US" smtClean="0"/>
-              <a:t>3/10/2020</a:t>
+              <a:t>3/12/2020</a:t>
             </a:fld>
             <a:endParaRPr lang="en-US"/>
           </a:p>
@@ -3356,7 +3363,7 @@
           <a:p>
             <a:r>
               <a:rPr lang="en-US" dirty="0"/>
-              <a:t>Career Finder Sprint 1 Demo</a:t>
+              <a:t>Career Finder Sprint 1 Presentation</a:t>
             </a:r>
           </a:p>
         </p:txBody>
@@ -3396,7 +3403,7 @@
             </a:br>
             <a:r>
               <a:rPr lang="en-US" dirty="0"/>
-              <a:t>Bob Caplin</a:t>
+              <a:t>Robert Caplin</a:t>
             </a:r>
             <a:br>
               <a:rPr lang="en-US" dirty="0"/>
@@ -3419,6 +3426,860 @@
     <p:extLst>
       <p:ext uri="{BB962C8B-B14F-4D97-AF65-F5344CB8AC3E}">
         <p14:creationId xmlns:p14="http://schemas.microsoft.com/office/powerpoint/2010/main" val="1974271564"/>
+      </p:ext>
+    </p:extLst>
+  </p:cSld>
+  <p:clrMapOvr>
+    <a:masterClrMapping/>
+  </p:clrMapOvr>
+</p:sld>
+</file>
+
+<file path=ppt/slides/slide10.xml><?xml version="1.0" encoding="utf-8"?>
+<p:sld xmlns:a="http://schemas.openxmlformats.org/drawingml/2006/main" xmlns:r="http://schemas.openxmlformats.org/officeDocument/2006/relationships" xmlns:p="http://schemas.openxmlformats.org/presentationml/2006/main">
+  <p:cSld>
+    <p:spTree>
+      <p:nvGrpSpPr>
+        <p:cNvPr id="1" name=""/>
+        <p:cNvGrpSpPr/>
+        <p:nvPr/>
+      </p:nvGrpSpPr>
+      <p:grpSpPr>
+        <a:xfrm>
+          <a:off x="0" y="0"/>
+          <a:ext cx="0" cy="0"/>
+          <a:chOff x="0" y="0"/>
+          <a:chExt cx="0" cy="0"/>
+        </a:xfrm>
+      </p:grpSpPr>
+      <p:sp>
+        <p:nvSpPr>
+          <p:cNvPr id="2" name="Title 1">
+            <a:extLst>
+              <a:ext uri="{FF2B5EF4-FFF2-40B4-BE49-F238E27FC236}">
+                <a16:creationId xmlns:a16="http://schemas.microsoft.com/office/drawing/2014/main" id="{79FF822E-DE6D-46C6-BDDD-8908F56654FC}"/>
+              </a:ext>
+            </a:extLst>
+          </p:cNvPr>
+          <p:cNvSpPr>
+            <a:spLocks noGrp="1"/>
+          </p:cNvSpPr>
+          <p:nvPr>
+            <p:ph type="title"/>
+          </p:nvPr>
+        </p:nvSpPr>
+        <p:spPr/>
+        <p:txBody>
+          <a:bodyPr/>
+          <a:lstStyle/>
+          <a:p>
+            <a:r>
+              <a:rPr lang="en-US" dirty="0"/>
+              <a:t>Wireframes – Career Detail Page</a:t>
+            </a:r>
+          </a:p>
+        </p:txBody>
+      </p:sp>
+      <p:pic>
+        <p:nvPicPr>
+          <p:cNvPr id="4" name="Picture 3">
+            <a:extLst>
+              <a:ext uri="{FF2B5EF4-FFF2-40B4-BE49-F238E27FC236}">
+                <a16:creationId xmlns:a16="http://schemas.microsoft.com/office/drawing/2014/main" id="{689C5477-5A3D-4B9B-8D21-667A5786F407}"/>
+              </a:ext>
+            </a:extLst>
+          </p:cNvPr>
+          <p:cNvPicPr>
+            <a:picLocks noChangeAspect="1"/>
+          </p:cNvPicPr>
+          <p:nvPr/>
+        </p:nvPicPr>
+        <p:blipFill>
+          <a:blip r:embed="rId2"/>
+          <a:stretch>
+            <a:fillRect/>
+          </a:stretch>
+        </p:blipFill>
+        <p:spPr>
+          <a:xfrm>
+            <a:off x="476075" y="1690688"/>
+            <a:ext cx="5334000" cy="4095750"/>
+          </a:xfrm>
+          <a:prstGeom prst="rect">
+            <a:avLst/>
+          </a:prstGeom>
+        </p:spPr>
+      </p:pic>
+      <p:pic>
+        <p:nvPicPr>
+          <p:cNvPr id="5" name="Picture 4">
+            <a:extLst>
+              <a:ext uri="{FF2B5EF4-FFF2-40B4-BE49-F238E27FC236}">
+                <a16:creationId xmlns:a16="http://schemas.microsoft.com/office/drawing/2014/main" id="{B63ACE39-5083-4755-A153-20FC1F8D466D}"/>
+              </a:ext>
+            </a:extLst>
+          </p:cNvPr>
+          <p:cNvPicPr>
+            <a:picLocks noChangeAspect="1"/>
+          </p:cNvPicPr>
+          <p:nvPr/>
+        </p:nvPicPr>
+        <p:blipFill>
+          <a:blip r:embed="rId3"/>
+          <a:stretch>
+            <a:fillRect/>
+          </a:stretch>
+        </p:blipFill>
+        <p:spPr>
+          <a:xfrm>
+            <a:off x="6381925" y="1690688"/>
+            <a:ext cx="5334000" cy="4086225"/>
+          </a:xfrm>
+          <a:prstGeom prst="rect">
+            <a:avLst/>
+          </a:prstGeom>
+        </p:spPr>
+      </p:pic>
+      <p:sp>
+        <p:nvSpPr>
+          <p:cNvPr id="6" name="TextBox 5">
+            <a:extLst>
+              <a:ext uri="{FF2B5EF4-FFF2-40B4-BE49-F238E27FC236}">
+                <a16:creationId xmlns:a16="http://schemas.microsoft.com/office/drawing/2014/main" id="{8E89F648-7A74-4423-B499-FD3019A0B0E5}"/>
+              </a:ext>
+            </a:extLst>
+          </p:cNvPr>
+          <p:cNvSpPr txBox="1"/>
+          <p:nvPr/>
+        </p:nvSpPr>
+        <p:spPr>
+          <a:xfrm>
+            <a:off x="476075" y="6014906"/>
+            <a:ext cx="5334000" cy="646331"/>
+          </a:xfrm>
+          <a:prstGeom prst="rect">
+            <a:avLst/>
+          </a:prstGeom>
+          <a:noFill/>
+        </p:spPr>
+        <p:txBody>
+          <a:bodyPr wrap="square" rtlCol="0">
+            <a:spAutoFit/>
+          </a:bodyPr>
+          <a:lstStyle/>
+          <a:p>
+            <a:r>
+              <a:rPr lang="en-US" dirty="0"/>
+              <a:t>Student – Displays Career base data, links to associated DITL and Celebrity profile if available.</a:t>
+            </a:r>
+          </a:p>
+        </p:txBody>
+      </p:sp>
+      <p:sp>
+        <p:nvSpPr>
+          <p:cNvPr id="7" name="TextBox 6">
+            <a:extLst>
+              <a:ext uri="{FF2B5EF4-FFF2-40B4-BE49-F238E27FC236}">
+                <a16:creationId xmlns:a16="http://schemas.microsoft.com/office/drawing/2014/main" id="{AED23486-CEAA-4CFF-9376-9FC42933A638}"/>
+              </a:ext>
+            </a:extLst>
+          </p:cNvPr>
+          <p:cNvSpPr txBox="1"/>
+          <p:nvPr/>
+        </p:nvSpPr>
+        <p:spPr>
+          <a:xfrm>
+            <a:off x="6381925" y="6014906"/>
+            <a:ext cx="5334000" cy="646331"/>
+          </a:xfrm>
+          <a:prstGeom prst="rect">
+            <a:avLst/>
+          </a:prstGeom>
+          <a:noFill/>
+        </p:spPr>
+        <p:txBody>
+          <a:bodyPr wrap="square" rtlCol="0">
+            <a:spAutoFit/>
+          </a:bodyPr>
+          <a:lstStyle/>
+          <a:p>
+            <a:r>
+              <a:rPr lang="en-US" dirty="0"/>
+              <a:t>Admin – Editable Career base data, links to associated DITL and Celebrity profile, keywords.</a:t>
+            </a:r>
+          </a:p>
+        </p:txBody>
+      </p:sp>
+    </p:spTree>
+    <p:extLst>
+      <p:ext uri="{BB962C8B-B14F-4D97-AF65-F5344CB8AC3E}">
+        <p14:creationId xmlns:p14="http://schemas.microsoft.com/office/powerpoint/2010/main" val="442265010"/>
+      </p:ext>
+    </p:extLst>
+  </p:cSld>
+  <p:clrMapOvr>
+    <a:masterClrMapping/>
+  </p:clrMapOvr>
+</p:sld>
+</file>
+
+<file path=ppt/slides/slide11.xml><?xml version="1.0" encoding="utf-8"?>
+<p:sld xmlns:a="http://schemas.openxmlformats.org/drawingml/2006/main" xmlns:r="http://schemas.openxmlformats.org/officeDocument/2006/relationships" xmlns:p="http://schemas.openxmlformats.org/presentationml/2006/main">
+  <p:cSld>
+    <p:spTree>
+      <p:nvGrpSpPr>
+        <p:cNvPr id="1" name=""/>
+        <p:cNvGrpSpPr/>
+        <p:nvPr/>
+      </p:nvGrpSpPr>
+      <p:grpSpPr>
+        <a:xfrm>
+          <a:off x="0" y="0"/>
+          <a:ext cx="0" cy="0"/>
+          <a:chOff x="0" y="0"/>
+          <a:chExt cx="0" cy="0"/>
+        </a:xfrm>
+      </p:grpSpPr>
+      <p:sp>
+        <p:nvSpPr>
+          <p:cNvPr id="2" name="Title 1">
+            <a:extLst>
+              <a:ext uri="{FF2B5EF4-FFF2-40B4-BE49-F238E27FC236}">
+                <a16:creationId xmlns:a16="http://schemas.microsoft.com/office/drawing/2014/main" id="{BBFF0E3E-42C1-4BA1-94D5-B718A5B38634}"/>
+              </a:ext>
+            </a:extLst>
+          </p:cNvPr>
+          <p:cNvSpPr>
+            <a:spLocks noGrp="1"/>
+          </p:cNvSpPr>
+          <p:nvPr>
+            <p:ph type="title"/>
+          </p:nvPr>
+        </p:nvSpPr>
+        <p:spPr/>
+        <p:txBody>
+          <a:bodyPr/>
+          <a:lstStyle/>
+          <a:p>
+            <a:r>
+              <a:rPr lang="en-US" dirty="0"/>
+              <a:t>Wireframes – Career DITL</a:t>
+            </a:r>
+          </a:p>
+        </p:txBody>
+      </p:sp>
+      <p:pic>
+        <p:nvPicPr>
+          <p:cNvPr id="4" name="Picture 3">
+            <a:extLst>
+              <a:ext uri="{FF2B5EF4-FFF2-40B4-BE49-F238E27FC236}">
+                <a16:creationId xmlns:a16="http://schemas.microsoft.com/office/drawing/2014/main" id="{CAA2759D-D9E6-4F88-BB16-53EEE9D4FB7F}"/>
+              </a:ext>
+            </a:extLst>
+          </p:cNvPr>
+          <p:cNvPicPr>
+            <a:picLocks noChangeAspect="1"/>
+          </p:cNvPicPr>
+          <p:nvPr/>
+        </p:nvPicPr>
+        <p:blipFill>
+          <a:blip r:embed="rId2"/>
+          <a:stretch>
+            <a:fillRect/>
+          </a:stretch>
+        </p:blipFill>
+        <p:spPr>
+          <a:xfrm>
+            <a:off x="486736" y="1690688"/>
+            <a:ext cx="5295900" cy="4076700"/>
+          </a:xfrm>
+          <a:prstGeom prst="rect">
+            <a:avLst/>
+          </a:prstGeom>
+        </p:spPr>
+      </p:pic>
+      <p:pic>
+        <p:nvPicPr>
+          <p:cNvPr id="5" name="Picture 4">
+            <a:extLst>
+              <a:ext uri="{FF2B5EF4-FFF2-40B4-BE49-F238E27FC236}">
+                <a16:creationId xmlns:a16="http://schemas.microsoft.com/office/drawing/2014/main" id="{BB5EDA82-4031-42E8-980C-D0E6AE53D829}"/>
+              </a:ext>
+            </a:extLst>
+          </p:cNvPr>
+          <p:cNvPicPr>
+            <a:picLocks noChangeAspect="1"/>
+          </p:cNvPicPr>
+          <p:nvPr/>
+        </p:nvPicPr>
+        <p:blipFill>
+          <a:blip r:embed="rId3"/>
+          <a:stretch>
+            <a:fillRect/>
+          </a:stretch>
+        </p:blipFill>
+        <p:spPr>
+          <a:xfrm>
+            <a:off x="6409366" y="1690688"/>
+            <a:ext cx="5324475" cy="4057650"/>
+          </a:xfrm>
+          <a:prstGeom prst="rect">
+            <a:avLst/>
+          </a:prstGeom>
+        </p:spPr>
+      </p:pic>
+      <p:sp>
+        <p:nvSpPr>
+          <p:cNvPr id="6" name="TextBox 5">
+            <a:extLst>
+              <a:ext uri="{FF2B5EF4-FFF2-40B4-BE49-F238E27FC236}">
+                <a16:creationId xmlns:a16="http://schemas.microsoft.com/office/drawing/2014/main" id="{00AB0AA3-4101-43ED-8D7C-54B0B925C387}"/>
+              </a:ext>
+            </a:extLst>
+          </p:cNvPr>
+          <p:cNvSpPr txBox="1"/>
+          <p:nvPr/>
+        </p:nvSpPr>
+        <p:spPr>
+          <a:xfrm>
+            <a:off x="486736" y="5896947"/>
+            <a:ext cx="5295900" cy="369332"/>
+          </a:xfrm>
+          <a:prstGeom prst="rect">
+            <a:avLst/>
+          </a:prstGeom>
+          <a:noFill/>
+        </p:spPr>
+        <p:txBody>
+          <a:bodyPr wrap="square" rtlCol="0">
+            <a:spAutoFit/>
+          </a:bodyPr>
+          <a:lstStyle/>
+          <a:p>
+            <a:r>
+              <a:rPr lang="en-US" dirty="0"/>
+              <a:t>Student – Able to read DITL article.</a:t>
+            </a:r>
+          </a:p>
+        </p:txBody>
+      </p:sp>
+      <p:sp>
+        <p:nvSpPr>
+          <p:cNvPr id="7" name="TextBox 6">
+            <a:extLst>
+              <a:ext uri="{FF2B5EF4-FFF2-40B4-BE49-F238E27FC236}">
+                <a16:creationId xmlns:a16="http://schemas.microsoft.com/office/drawing/2014/main" id="{FBE57EB6-9329-4507-9A36-DEFF8BFC75FD}"/>
+              </a:ext>
+            </a:extLst>
+          </p:cNvPr>
+          <p:cNvSpPr txBox="1"/>
+          <p:nvPr/>
+        </p:nvSpPr>
+        <p:spPr>
+          <a:xfrm>
+            <a:off x="6409364" y="5896947"/>
+            <a:ext cx="5295900" cy="369332"/>
+          </a:xfrm>
+          <a:prstGeom prst="rect">
+            <a:avLst/>
+          </a:prstGeom>
+          <a:noFill/>
+        </p:spPr>
+        <p:txBody>
+          <a:bodyPr wrap="square" rtlCol="0">
+            <a:spAutoFit/>
+          </a:bodyPr>
+          <a:lstStyle/>
+          <a:p>
+            <a:r>
+              <a:rPr lang="en-US" dirty="0"/>
+              <a:t>Admin – Able to edit Day-in-the-Life article.</a:t>
+            </a:r>
+          </a:p>
+        </p:txBody>
+      </p:sp>
+    </p:spTree>
+    <p:extLst>
+      <p:ext uri="{BB962C8B-B14F-4D97-AF65-F5344CB8AC3E}">
+        <p14:creationId xmlns:p14="http://schemas.microsoft.com/office/powerpoint/2010/main" val="1787255540"/>
+      </p:ext>
+    </p:extLst>
+  </p:cSld>
+  <p:clrMapOvr>
+    <a:masterClrMapping/>
+  </p:clrMapOvr>
+</p:sld>
+</file>
+
+<file path=ppt/slides/slide12.xml><?xml version="1.0" encoding="utf-8"?>
+<p:sld xmlns:a="http://schemas.openxmlformats.org/drawingml/2006/main" xmlns:r="http://schemas.openxmlformats.org/officeDocument/2006/relationships" xmlns:p="http://schemas.openxmlformats.org/presentationml/2006/main">
+  <p:cSld>
+    <p:spTree>
+      <p:nvGrpSpPr>
+        <p:cNvPr id="1" name=""/>
+        <p:cNvGrpSpPr/>
+        <p:nvPr/>
+      </p:nvGrpSpPr>
+      <p:grpSpPr>
+        <a:xfrm>
+          <a:off x="0" y="0"/>
+          <a:ext cx="0" cy="0"/>
+          <a:chOff x="0" y="0"/>
+          <a:chExt cx="0" cy="0"/>
+        </a:xfrm>
+      </p:grpSpPr>
+      <p:sp>
+        <p:nvSpPr>
+          <p:cNvPr id="2" name="Title 1">
+            <a:extLst>
+              <a:ext uri="{FF2B5EF4-FFF2-40B4-BE49-F238E27FC236}">
+                <a16:creationId xmlns:a16="http://schemas.microsoft.com/office/drawing/2014/main" id="{F1C85D82-0FDD-4D49-9EA1-1BDBEE163824}"/>
+              </a:ext>
+            </a:extLst>
+          </p:cNvPr>
+          <p:cNvSpPr>
+            <a:spLocks noGrp="1"/>
+          </p:cNvSpPr>
+          <p:nvPr>
+            <p:ph type="title"/>
+          </p:nvPr>
+        </p:nvSpPr>
+        <p:spPr/>
+        <p:txBody>
+          <a:bodyPr/>
+          <a:lstStyle/>
+          <a:p>
+            <a:r>
+              <a:rPr lang="en-US" dirty="0"/>
+              <a:t>Wireframes – Career/ Celebrity Profile</a:t>
+            </a:r>
+          </a:p>
+        </p:txBody>
+      </p:sp>
+      <p:pic>
+        <p:nvPicPr>
+          <p:cNvPr id="4" name="Picture 3">
+            <a:extLst>
+              <a:ext uri="{FF2B5EF4-FFF2-40B4-BE49-F238E27FC236}">
+                <a16:creationId xmlns:a16="http://schemas.microsoft.com/office/drawing/2014/main" id="{BB4E2BA4-17FB-4BA0-8B5E-CA1870560804}"/>
+              </a:ext>
+            </a:extLst>
+          </p:cNvPr>
+          <p:cNvPicPr>
+            <a:picLocks noChangeAspect="1"/>
+          </p:cNvPicPr>
+          <p:nvPr/>
+        </p:nvPicPr>
+        <p:blipFill>
+          <a:blip r:embed="rId2"/>
+          <a:stretch>
+            <a:fillRect/>
+          </a:stretch>
+        </p:blipFill>
+        <p:spPr>
+          <a:xfrm>
+            <a:off x="489226" y="1690688"/>
+            <a:ext cx="5324475" cy="4076700"/>
+          </a:xfrm>
+          <a:prstGeom prst="rect">
+            <a:avLst/>
+          </a:prstGeom>
+        </p:spPr>
+      </p:pic>
+      <p:pic>
+        <p:nvPicPr>
+          <p:cNvPr id="5" name="Picture 4">
+            <a:extLst>
+              <a:ext uri="{FF2B5EF4-FFF2-40B4-BE49-F238E27FC236}">
+                <a16:creationId xmlns:a16="http://schemas.microsoft.com/office/drawing/2014/main" id="{A6B3D2E4-DD0B-4B2B-8E0C-25E5E08DD6DE}"/>
+              </a:ext>
+            </a:extLst>
+          </p:cNvPr>
+          <p:cNvPicPr>
+            <a:picLocks noChangeAspect="1"/>
+          </p:cNvPicPr>
+          <p:nvPr/>
+        </p:nvPicPr>
+        <p:blipFill>
+          <a:blip r:embed="rId3"/>
+          <a:stretch>
+            <a:fillRect/>
+          </a:stretch>
+        </p:blipFill>
+        <p:spPr>
+          <a:xfrm>
+            <a:off x="6378301" y="1690688"/>
+            <a:ext cx="5305425" cy="4076700"/>
+          </a:xfrm>
+          <a:prstGeom prst="rect">
+            <a:avLst/>
+          </a:prstGeom>
+        </p:spPr>
+      </p:pic>
+      <p:sp>
+        <p:nvSpPr>
+          <p:cNvPr id="6" name="TextBox 5">
+            <a:extLst>
+              <a:ext uri="{FF2B5EF4-FFF2-40B4-BE49-F238E27FC236}">
+                <a16:creationId xmlns:a16="http://schemas.microsoft.com/office/drawing/2014/main" id="{4C18876A-EF1B-4BAF-B375-DC1E32B84408}"/>
+              </a:ext>
+            </a:extLst>
+          </p:cNvPr>
+          <p:cNvSpPr txBox="1"/>
+          <p:nvPr/>
+        </p:nvSpPr>
+        <p:spPr>
+          <a:xfrm>
+            <a:off x="489226" y="5838738"/>
+            <a:ext cx="5324475" cy="646331"/>
+          </a:xfrm>
+          <a:prstGeom prst="rect">
+            <a:avLst/>
+          </a:prstGeom>
+          <a:noFill/>
+        </p:spPr>
+        <p:txBody>
+          <a:bodyPr wrap="square" rtlCol="0">
+            <a:spAutoFit/>
+          </a:bodyPr>
+          <a:lstStyle/>
+          <a:p>
+            <a:r>
+              <a:rPr lang="en-US" dirty="0"/>
+              <a:t>Student – Able to view celebrity photo, name, and article if available.</a:t>
+            </a:r>
+          </a:p>
+        </p:txBody>
+      </p:sp>
+      <p:sp>
+        <p:nvSpPr>
+          <p:cNvPr id="7" name="TextBox 6">
+            <a:extLst>
+              <a:ext uri="{FF2B5EF4-FFF2-40B4-BE49-F238E27FC236}">
+                <a16:creationId xmlns:a16="http://schemas.microsoft.com/office/drawing/2014/main" id="{7C35FD86-55DC-4308-90B3-D33230B78B5E}"/>
+              </a:ext>
+            </a:extLst>
+          </p:cNvPr>
+          <p:cNvSpPr txBox="1"/>
+          <p:nvPr/>
+        </p:nvSpPr>
+        <p:spPr>
+          <a:xfrm>
+            <a:off x="6378301" y="5838738"/>
+            <a:ext cx="5324475" cy="646331"/>
+          </a:xfrm>
+          <a:prstGeom prst="rect">
+            <a:avLst/>
+          </a:prstGeom>
+          <a:noFill/>
+        </p:spPr>
+        <p:txBody>
+          <a:bodyPr wrap="square" rtlCol="0">
+            <a:spAutoFit/>
+          </a:bodyPr>
+          <a:lstStyle/>
+          <a:p>
+            <a:r>
+              <a:rPr lang="en-US" dirty="0"/>
+              <a:t>Admin – Able to edit celebrity photo and article if available.</a:t>
+            </a:r>
+          </a:p>
+        </p:txBody>
+      </p:sp>
+    </p:spTree>
+    <p:extLst>
+      <p:ext uri="{BB962C8B-B14F-4D97-AF65-F5344CB8AC3E}">
+        <p14:creationId xmlns:p14="http://schemas.microsoft.com/office/powerpoint/2010/main" val="3411926142"/>
+      </p:ext>
+    </p:extLst>
+  </p:cSld>
+  <p:clrMapOvr>
+    <a:masterClrMapping/>
+  </p:clrMapOvr>
+</p:sld>
+</file>
+
+<file path=ppt/slides/slide13.xml><?xml version="1.0" encoding="utf-8"?>
+<p:sld xmlns:a="http://schemas.openxmlformats.org/drawingml/2006/main" xmlns:r="http://schemas.openxmlformats.org/officeDocument/2006/relationships" xmlns:p="http://schemas.openxmlformats.org/presentationml/2006/main">
+  <p:cSld>
+    <p:spTree>
+      <p:nvGrpSpPr>
+        <p:cNvPr id="1" name=""/>
+        <p:cNvGrpSpPr/>
+        <p:nvPr/>
+      </p:nvGrpSpPr>
+      <p:grpSpPr>
+        <a:xfrm>
+          <a:off x="0" y="0"/>
+          <a:ext cx="0" cy="0"/>
+          <a:chOff x="0" y="0"/>
+          <a:chExt cx="0" cy="0"/>
+        </a:xfrm>
+      </p:grpSpPr>
+      <p:sp>
+        <p:nvSpPr>
+          <p:cNvPr id="2" name="Title 1">
+            <a:extLst>
+              <a:ext uri="{FF2B5EF4-FFF2-40B4-BE49-F238E27FC236}">
+                <a16:creationId xmlns:a16="http://schemas.microsoft.com/office/drawing/2014/main" id="{A6E11F29-642E-40E8-B789-DFB647E7ADB3}"/>
+              </a:ext>
+            </a:extLst>
+          </p:cNvPr>
+          <p:cNvSpPr>
+            <a:spLocks noGrp="1"/>
+          </p:cNvSpPr>
+          <p:nvPr>
+            <p:ph type="title"/>
+          </p:nvPr>
+        </p:nvSpPr>
+        <p:spPr/>
+        <p:txBody>
+          <a:bodyPr/>
+          <a:lstStyle/>
+          <a:p>
+            <a:r>
+              <a:rPr lang="en-US" dirty="0"/>
+              <a:t>System Context Model</a:t>
+            </a:r>
+          </a:p>
+        </p:txBody>
+      </p:sp>
+      <p:sp>
+        <p:nvSpPr>
+          <p:cNvPr id="3" name="Content Placeholder 2">
+            <a:extLst>
+              <a:ext uri="{FF2B5EF4-FFF2-40B4-BE49-F238E27FC236}">
+                <a16:creationId xmlns:a16="http://schemas.microsoft.com/office/drawing/2014/main" id="{6C4C06F5-9A55-4268-9A56-A91C9293C9BB}"/>
+              </a:ext>
+            </a:extLst>
+          </p:cNvPr>
+          <p:cNvSpPr>
+            <a:spLocks noGrp="1"/>
+          </p:cNvSpPr>
+          <p:nvPr>
+            <p:ph idx="1"/>
+          </p:nvPr>
+        </p:nvSpPr>
+        <p:spPr/>
+        <p:txBody>
+          <a:bodyPr/>
+          <a:lstStyle/>
+          <a:p>
+            <a:endParaRPr lang="en-US"/>
+          </a:p>
+        </p:txBody>
+      </p:sp>
+    </p:spTree>
+    <p:extLst>
+      <p:ext uri="{BB962C8B-B14F-4D97-AF65-F5344CB8AC3E}">
+        <p14:creationId xmlns:p14="http://schemas.microsoft.com/office/powerpoint/2010/main" val="2192192540"/>
+      </p:ext>
+    </p:extLst>
+  </p:cSld>
+  <p:clrMapOvr>
+    <a:masterClrMapping/>
+  </p:clrMapOvr>
+</p:sld>
+</file>
+
+<file path=ppt/slides/slide14.xml><?xml version="1.0" encoding="utf-8"?>
+<p:sld xmlns:a="http://schemas.openxmlformats.org/drawingml/2006/main" xmlns:r="http://schemas.openxmlformats.org/officeDocument/2006/relationships" xmlns:p="http://schemas.openxmlformats.org/presentationml/2006/main">
+  <p:cSld>
+    <p:spTree>
+      <p:nvGrpSpPr>
+        <p:cNvPr id="1" name=""/>
+        <p:cNvGrpSpPr/>
+        <p:nvPr/>
+      </p:nvGrpSpPr>
+      <p:grpSpPr>
+        <a:xfrm>
+          <a:off x="0" y="0"/>
+          <a:ext cx="0" cy="0"/>
+          <a:chOff x="0" y="0"/>
+          <a:chExt cx="0" cy="0"/>
+        </a:xfrm>
+      </p:grpSpPr>
+      <p:sp>
+        <p:nvSpPr>
+          <p:cNvPr id="2" name="Title 1">
+            <a:extLst>
+              <a:ext uri="{FF2B5EF4-FFF2-40B4-BE49-F238E27FC236}">
+                <a16:creationId xmlns:a16="http://schemas.microsoft.com/office/drawing/2014/main" id="{67679B60-390F-4985-89EA-BA2155A34027}"/>
+              </a:ext>
+            </a:extLst>
+          </p:cNvPr>
+          <p:cNvSpPr>
+            <a:spLocks noGrp="1"/>
+          </p:cNvSpPr>
+          <p:nvPr>
+            <p:ph type="title"/>
+          </p:nvPr>
+        </p:nvSpPr>
+        <p:spPr/>
+        <p:txBody>
+          <a:bodyPr/>
+          <a:lstStyle/>
+          <a:p>
+            <a:r>
+              <a:rPr lang="en-US" dirty="0"/>
+              <a:t>Materials Used (Sources)</a:t>
+            </a:r>
+          </a:p>
+        </p:txBody>
+      </p:sp>
+      <p:sp>
+        <p:nvSpPr>
+          <p:cNvPr id="3" name="Content Placeholder 2">
+            <a:extLst>
+              <a:ext uri="{FF2B5EF4-FFF2-40B4-BE49-F238E27FC236}">
+                <a16:creationId xmlns:a16="http://schemas.microsoft.com/office/drawing/2014/main" id="{6F3DDD06-568A-42C2-B6ED-3EE56767B3D7}"/>
+              </a:ext>
+            </a:extLst>
+          </p:cNvPr>
+          <p:cNvSpPr>
+            <a:spLocks noGrp="1"/>
+          </p:cNvSpPr>
+          <p:nvPr>
+            <p:ph idx="1"/>
+          </p:nvPr>
+        </p:nvSpPr>
+        <p:spPr/>
+        <p:txBody>
+          <a:bodyPr/>
+          <a:lstStyle/>
+          <a:p>
+            <a:pPr marL="0" indent="0">
+              <a:buNone/>
+            </a:pPr>
+            <a:r>
+              <a:rPr lang="en-US" dirty="0"/>
+              <a:t>(I think this is just our opportunity to declare any external code sources used to develop the site… like if we closely followed a tutorial, forum post, </a:t>
+            </a:r>
+            <a:r>
+              <a:rPr lang="en-US" dirty="0" err="1"/>
+              <a:t>etc</a:t>
+            </a:r>
+            <a:r>
+              <a:rPr lang="en-US" dirty="0"/>
+              <a:t>)</a:t>
+            </a:r>
+          </a:p>
+        </p:txBody>
+      </p:sp>
+    </p:spTree>
+    <p:extLst>
+      <p:ext uri="{BB962C8B-B14F-4D97-AF65-F5344CB8AC3E}">
+        <p14:creationId xmlns:p14="http://schemas.microsoft.com/office/powerpoint/2010/main" val="1029897165"/>
+      </p:ext>
+    </p:extLst>
+  </p:cSld>
+  <p:clrMapOvr>
+    <a:masterClrMapping/>
+  </p:clrMapOvr>
+</p:sld>
+</file>
+
+<file path=ppt/slides/slide15.xml><?xml version="1.0" encoding="utf-8"?>
+<p:sld xmlns:a="http://schemas.openxmlformats.org/drawingml/2006/main" xmlns:r="http://schemas.openxmlformats.org/officeDocument/2006/relationships" xmlns:p="http://schemas.openxmlformats.org/presentationml/2006/main">
+  <p:cSld>
+    <p:spTree>
+      <p:nvGrpSpPr>
+        <p:cNvPr id="1" name=""/>
+        <p:cNvGrpSpPr/>
+        <p:nvPr/>
+      </p:nvGrpSpPr>
+      <p:grpSpPr>
+        <a:xfrm>
+          <a:off x="0" y="0"/>
+          <a:ext cx="0" cy="0"/>
+          <a:chOff x="0" y="0"/>
+          <a:chExt cx="0" cy="0"/>
+        </a:xfrm>
+      </p:grpSpPr>
+      <p:sp>
+        <p:nvSpPr>
+          <p:cNvPr id="2" name="Title 1">
+            <a:extLst>
+              <a:ext uri="{FF2B5EF4-FFF2-40B4-BE49-F238E27FC236}">
+                <a16:creationId xmlns:a16="http://schemas.microsoft.com/office/drawing/2014/main" id="{00D7B7DD-6726-4E97-B33C-2FF9A3F83A2F}"/>
+              </a:ext>
+            </a:extLst>
+          </p:cNvPr>
+          <p:cNvSpPr>
+            <a:spLocks noGrp="1"/>
+          </p:cNvSpPr>
+          <p:nvPr>
+            <p:ph type="title"/>
+          </p:nvPr>
+        </p:nvSpPr>
+        <p:spPr/>
+        <p:txBody>
+          <a:bodyPr/>
+          <a:lstStyle/>
+          <a:p>
+            <a:r>
+              <a:rPr lang="en-US" dirty="0"/>
+              <a:t>Career Finder Demo</a:t>
+            </a:r>
+          </a:p>
+        </p:txBody>
+      </p:sp>
+      <p:sp>
+        <p:nvSpPr>
+          <p:cNvPr id="3" name="Content Placeholder 2">
+            <a:extLst>
+              <a:ext uri="{FF2B5EF4-FFF2-40B4-BE49-F238E27FC236}">
+                <a16:creationId xmlns:a16="http://schemas.microsoft.com/office/drawing/2014/main" id="{0C77D4AA-5DDD-454E-8C53-889124C88CCE}"/>
+              </a:ext>
+            </a:extLst>
+          </p:cNvPr>
+          <p:cNvSpPr>
+            <a:spLocks noGrp="1"/>
+          </p:cNvSpPr>
+          <p:nvPr>
+            <p:ph idx="1"/>
+          </p:nvPr>
+        </p:nvSpPr>
+        <p:spPr/>
+        <p:txBody>
+          <a:bodyPr/>
+          <a:lstStyle/>
+          <a:p>
+            <a:r>
+              <a:rPr lang="en-US" dirty="0">
+                <a:hlinkClick r:id="rId2"/>
+              </a:rPr>
+              <a:t>https://nameless-gorge-50235.herokuapp.com/</a:t>
+            </a:r>
+            <a:endParaRPr lang="en-US" dirty="0"/>
+          </a:p>
+          <a:p>
+            <a:endParaRPr lang="en-US" dirty="0"/>
+          </a:p>
+          <a:p>
+            <a:endParaRPr lang="en-US" dirty="0"/>
+          </a:p>
+          <a:p>
+            <a:r>
+              <a:rPr lang="en-US" dirty="0"/>
+              <a:t>Demonstration of current functionality.</a:t>
+            </a:r>
+          </a:p>
+          <a:p>
+            <a:endParaRPr lang="en-US" dirty="0"/>
+          </a:p>
+          <a:p>
+            <a:r>
+              <a:rPr lang="en-US" dirty="0"/>
+              <a:t>Questions?</a:t>
+            </a:r>
+          </a:p>
+        </p:txBody>
+      </p:sp>
+    </p:spTree>
+    <p:extLst>
+      <p:ext uri="{BB962C8B-B14F-4D97-AF65-F5344CB8AC3E}">
+        <p14:creationId xmlns:p14="http://schemas.microsoft.com/office/powerpoint/2010/main" val="1310432167"/>
       </p:ext>
     </p:extLst>
   </p:cSld>
@@ -3468,7 +4329,7 @@
           <a:p>
             <a:r>
               <a:rPr lang="en-US" dirty="0"/>
-              <a:t>Career Finder</a:t>
+              <a:t>Career Finder - Background</a:t>
             </a:r>
           </a:p>
         </p:txBody>
@@ -3491,22 +4352,122 @@
         </p:nvSpPr>
         <p:spPr/>
         <p:txBody>
-          <a:bodyPr/>
-          <a:lstStyle/>
-          <a:p>
-            <a:r>
-              <a:rPr lang="en-US" dirty="0"/>
-              <a:t>A career counseling application for a local middle school.</a:t>
+          <a:bodyPr>
+            <a:normAutofit fontScale="85000" lnSpcReduction="10000"/>
+          </a:bodyPr>
+          <a:lstStyle/>
+          <a:p>
+            <a:r>
+              <a:rPr lang="en-US" dirty="0"/>
+              <a:t>A career counseling application for a local middle school that should:</a:t>
             </a:r>
           </a:p>
           <a:p>
             <a:endParaRPr lang="en-US" dirty="0"/>
           </a:p>
           <a:p>
-            <a:r>
-              <a:rPr lang="en-US" dirty="0"/>
-              <a:t>Implemented using the MERN stack.</a:t>
-            </a:r>
+            <a:pPr marL="914400" lvl="1" indent="-457200">
+              <a:buFont typeface="+mj-lt"/>
+              <a:buAutoNum type="arabicPeriod"/>
+            </a:pPr>
+            <a:r>
+              <a:rPr lang="en-US" dirty="0"/>
+              <a:t>be a fun way for students to explore career options they may be unaware of.</a:t>
+            </a:r>
+          </a:p>
+          <a:p>
+            <a:pPr marL="914400" lvl="1" indent="-457200">
+              <a:buFont typeface="+mj-lt"/>
+              <a:buAutoNum type="arabicPeriod"/>
+            </a:pPr>
+            <a:endParaRPr lang="en-US" dirty="0"/>
+          </a:p>
+          <a:p>
+            <a:pPr marL="914400" lvl="1" indent="-457200">
+              <a:buFont typeface="+mj-lt"/>
+              <a:buAutoNum type="arabicPeriod"/>
+            </a:pPr>
+            <a:r>
+              <a:rPr lang="en-US" dirty="0"/>
+              <a:t>allow school staff to manage system content like:</a:t>
+            </a:r>
+          </a:p>
+          <a:p>
+            <a:pPr lvl="2"/>
+            <a:r>
+              <a:rPr lang="en-US" dirty="0"/>
+              <a:t>Career Cluster names, icons.</a:t>
+            </a:r>
+          </a:p>
+          <a:p>
+            <a:pPr lvl="2"/>
+            <a:r>
+              <a:rPr lang="en-US" dirty="0"/>
+              <a:t>Career names, salary, description, associated DITL and Celebrity articles.</a:t>
+            </a:r>
+          </a:p>
+          <a:p>
+            <a:pPr lvl="2"/>
+            <a:endParaRPr lang="en-US" dirty="0"/>
+          </a:p>
+          <a:p>
+            <a:pPr marL="914400" lvl="1" indent="-457200">
+              <a:buFont typeface="+mj-lt"/>
+              <a:buAutoNum type="arabicPeriod"/>
+            </a:pPr>
+            <a:r>
+              <a:rPr lang="en-US" dirty="0"/>
+              <a:t>allow school staff to manage student User and staff Admin accounts.</a:t>
+            </a:r>
+          </a:p>
+          <a:p>
+            <a:pPr marL="914400" lvl="1" indent="-457200">
+              <a:buFont typeface="+mj-lt"/>
+              <a:buAutoNum type="arabicPeriod"/>
+            </a:pPr>
+            <a:endParaRPr lang="en-US" dirty="0"/>
+          </a:p>
+          <a:p>
+            <a:pPr marL="914400" lvl="1" indent="-457200">
+              <a:buFont typeface="+mj-lt"/>
+              <a:buAutoNum type="arabicPeriod"/>
+            </a:pPr>
+            <a:r>
+              <a:rPr lang="en-US" dirty="0"/>
+              <a:t>implement a Chat Counselor  to make Career Cluster recommendations to students.</a:t>
+            </a:r>
+          </a:p>
+          <a:p>
+            <a:pPr marL="914400" lvl="1" indent="-457200">
+              <a:buFont typeface="+mj-lt"/>
+              <a:buAutoNum type="arabicPeriod"/>
+            </a:pPr>
+            <a:endParaRPr lang="en-US" dirty="0"/>
+          </a:p>
+          <a:p>
+            <a:pPr marL="914400" lvl="1" indent="-457200">
+              <a:buFont typeface="+mj-lt"/>
+              <a:buAutoNum type="arabicPeriod"/>
+            </a:pPr>
+            <a:r>
+              <a:rPr lang="en-US" dirty="0"/>
+              <a:t>track progress and reward students via a point-based system for viewing content in the system.</a:t>
+            </a:r>
+          </a:p>
+          <a:p>
+            <a:pPr lvl="1"/>
+            <a:endParaRPr lang="en-US" dirty="0"/>
+          </a:p>
+          <a:p>
+            <a:pPr lvl="1"/>
+            <a:endParaRPr lang="en-US" dirty="0"/>
+          </a:p>
+          <a:p>
+            <a:pPr lvl="1"/>
+            <a:endParaRPr lang="en-US" dirty="0"/>
+          </a:p>
+          <a:p>
+            <a:endParaRPr lang="en-US" dirty="0"/>
           </a:p>
         </p:txBody>
       </p:sp>
@@ -3545,7 +4506,7 @@
           <p:cNvPr id="2" name="Title 1">
             <a:extLst>
               <a:ext uri="{FF2B5EF4-FFF2-40B4-BE49-F238E27FC236}">
-                <a16:creationId xmlns:a16="http://schemas.microsoft.com/office/drawing/2014/main" id="{A4387C3F-11DA-4A1A-A744-F0CE28850DD8}"/>
+                <a16:creationId xmlns:a16="http://schemas.microsoft.com/office/drawing/2014/main" id="{4E9319AD-7D80-4914-AC27-4AD0E062B7F9}"/>
               </a:ext>
             </a:extLst>
           </p:cNvPr>
@@ -3563,7 +4524,7 @@
           <a:p>
             <a:r>
               <a:rPr lang="en-US" dirty="0"/>
-              <a:t>Features Delivered During Sprint 1</a:t>
+              <a:t>Career Finder – Tech Stack</a:t>
             </a:r>
           </a:p>
         </p:txBody>
@@ -3573,7 +4534,7 @@
           <p:cNvPr id="3" name="Content Placeholder 2">
             <a:extLst>
               <a:ext uri="{FF2B5EF4-FFF2-40B4-BE49-F238E27FC236}">
-                <a16:creationId xmlns:a16="http://schemas.microsoft.com/office/drawing/2014/main" id="{EE01A7C8-F2B9-4EA6-AD22-9C8295CD2E94}"/>
+                <a16:creationId xmlns:a16="http://schemas.microsoft.com/office/drawing/2014/main" id="{4FBEFD33-F5DE-4861-BB08-0AEDD7439FE0}"/>
               </a:ext>
             </a:extLst>
           </p:cNvPr>
@@ -3591,31 +4552,57 @@
           <a:p>
             <a:r>
               <a:rPr lang="en-US" dirty="0"/>
-              <a:t>CF09. Celebrity Profile Page</a:t>
+              <a:t>MERN</a:t>
             </a:r>
           </a:p>
           <a:p>
             <a:pPr lvl="1"/>
             <a:r>
               <a:rPr lang="en-US" dirty="0"/>
-              <a:t>A page to display celebrity profiles.</a:t>
-            </a:r>
-          </a:p>
-          <a:p>
-            <a:r>
-              <a:rPr lang="en-US" dirty="0"/>
-              <a:t>Material-UI Front End – Log-in page, main page, career page, DITL page, celebrity profile page</a:t>
-            </a:r>
-          </a:p>
-          <a:p>
-            <a:endParaRPr lang="en-US" dirty="0"/>
+              <a:t>MongoDB</a:t>
+            </a:r>
+          </a:p>
+          <a:p>
+            <a:pPr lvl="2"/>
+            <a:r>
+              <a:rPr lang="en-US" dirty="0"/>
+              <a:t>Mongoose</a:t>
+            </a:r>
+          </a:p>
+          <a:p>
+            <a:pPr lvl="1"/>
+            <a:r>
+              <a:rPr lang="en-US" dirty="0"/>
+              <a:t>Express</a:t>
+            </a:r>
+          </a:p>
+          <a:p>
+            <a:pPr lvl="1"/>
+            <a:r>
+              <a:rPr lang="en-US" dirty="0"/>
+              <a:t>React</a:t>
+            </a:r>
+          </a:p>
+          <a:p>
+            <a:pPr lvl="2"/>
+            <a:r>
+              <a:rPr lang="en-US" dirty="0"/>
+              <a:t>Material-UI</a:t>
+            </a:r>
+          </a:p>
+          <a:p>
+            <a:pPr lvl="1"/>
+            <a:r>
+              <a:rPr lang="en-US" dirty="0"/>
+              <a:t>Node</a:t>
+            </a:r>
           </a:p>
         </p:txBody>
       </p:sp>
     </p:spTree>
     <p:extLst>
       <p:ext uri="{BB962C8B-B14F-4D97-AF65-F5344CB8AC3E}">
-        <p14:creationId xmlns:p14="http://schemas.microsoft.com/office/powerpoint/2010/main" val="4167474593"/>
+        <p14:creationId xmlns:p14="http://schemas.microsoft.com/office/powerpoint/2010/main" val="790913264"/>
       </p:ext>
     </p:extLst>
   </p:cSld>
@@ -3647,7 +4634,7 @@
           <p:cNvPr id="2" name="Title 1">
             <a:extLst>
               <a:ext uri="{FF2B5EF4-FFF2-40B4-BE49-F238E27FC236}">
-                <a16:creationId xmlns:a16="http://schemas.microsoft.com/office/drawing/2014/main" id="{50B95908-D75C-4C64-8779-7111DB198EEF}"/>
+                <a16:creationId xmlns:a16="http://schemas.microsoft.com/office/drawing/2014/main" id="{A4387C3F-11DA-4A1A-A744-F0CE28850DD8}"/>
               </a:ext>
             </a:extLst>
           </p:cNvPr>
@@ -3665,7 +4652,7 @@
           <a:p>
             <a:r>
               <a:rPr lang="en-US" dirty="0"/>
-              <a:t>Resource Allocation</a:t>
+              <a:t>Features Delivered During Sprint 1</a:t>
             </a:r>
           </a:p>
         </p:txBody>
@@ -3675,7 +4662,7 @@
           <p:cNvPr id="3" name="Content Placeholder 2">
             <a:extLst>
               <a:ext uri="{FF2B5EF4-FFF2-40B4-BE49-F238E27FC236}">
-                <a16:creationId xmlns:a16="http://schemas.microsoft.com/office/drawing/2014/main" id="{ACB78887-10B6-469C-AEB2-EAA14509F8C0}"/>
+                <a16:creationId xmlns:a16="http://schemas.microsoft.com/office/drawing/2014/main" id="{EE01A7C8-F2B9-4EA6-AD22-9C8295CD2E94}"/>
               </a:ext>
             </a:extLst>
           </p:cNvPr>
@@ -3695,83 +4682,82 @@
           <a:p>
             <a:r>
               <a:rPr lang="en-US" dirty="0"/>
-              <a:t>Brian Hicks</a:t>
+              <a:t>Deployed Career Finder site.</a:t>
+            </a:r>
+          </a:p>
+          <a:p>
+            <a:pPr marL="0" indent="0">
+              <a:buNone/>
+            </a:pPr>
+            <a:endParaRPr lang="en-US" dirty="0"/>
+          </a:p>
+          <a:p>
+            <a:r>
+              <a:rPr lang="en-US" dirty="0"/>
+              <a:t>CF09. Celebrity Profile Page</a:t>
             </a:r>
           </a:p>
           <a:p>
             <a:pPr lvl="1"/>
             <a:r>
               <a:rPr lang="en-US" dirty="0"/>
-              <a:t>System Context Model</a:t>
+              <a:t>A page to display celebrity profiles.</a:t>
             </a:r>
           </a:p>
           <a:p>
             <a:pPr lvl="1"/>
-            <a:r>
-              <a:rPr lang="en-US" dirty="0"/>
-              <a:t>CF09 Front and Back end development</a:t>
+            <a:endParaRPr lang="en-US" dirty="0"/>
+          </a:p>
+          <a:p>
+            <a:r>
+              <a:rPr lang="en-US" dirty="0"/>
+              <a:t>Material-UI Front End</a:t>
             </a:r>
           </a:p>
           <a:p>
             <a:pPr lvl="1"/>
             <a:r>
               <a:rPr lang="en-US" dirty="0"/>
-              <a:t>Material-UI Front End</a:t>
-            </a:r>
-          </a:p>
-          <a:p>
-            <a:r>
-              <a:rPr lang="en-US" dirty="0"/>
-              <a:t>Brian Snow</a:t>
+              <a:t>Log-in page</a:t>
             </a:r>
           </a:p>
           <a:p>
             <a:pPr lvl="1"/>
             <a:r>
               <a:rPr lang="en-US" dirty="0"/>
-              <a:t>User Authentication</a:t>
-            </a:r>
-          </a:p>
-          <a:p>
-            <a:r>
-              <a:rPr lang="en-US" dirty="0"/>
-              <a:t>Bob Caplin</a:t>
+              <a:t>main page</a:t>
             </a:r>
           </a:p>
           <a:p>
             <a:pPr lvl="1"/>
             <a:r>
               <a:rPr lang="en-US" dirty="0"/>
-              <a:t>Story Map</a:t>
+              <a:t>career page</a:t>
             </a:r>
           </a:p>
           <a:p>
             <a:pPr lvl="1"/>
             <a:r>
               <a:rPr lang="en-US" dirty="0"/>
-              <a:t>Wireframes</a:t>
+              <a:t>DITL page</a:t>
             </a:r>
           </a:p>
           <a:p>
             <a:pPr lvl="1"/>
             <a:r>
               <a:rPr lang="en-US" dirty="0"/>
-              <a:t>Presentation</a:t>
-            </a:r>
-          </a:p>
-          <a:p>
-            <a:pPr lvl="1"/>
-            <a:r>
-              <a:rPr lang="en-US" dirty="0"/>
-              <a:t>CF09 test case</a:t>
-            </a:r>
+              <a:t>celebrity profile page</a:t>
+            </a:r>
+          </a:p>
+          <a:p>
+            <a:endParaRPr lang="en-US" dirty="0"/>
           </a:p>
         </p:txBody>
       </p:sp>
     </p:spTree>
     <p:extLst>
       <p:ext uri="{BB962C8B-B14F-4D97-AF65-F5344CB8AC3E}">
-        <p14:creationId xmlns:p14="http://schemas.microsoft.com/office/powerpoint/2010/main" val="2589486596"/>
+        <p14:creationId xmlns:p14="http://schemas.microsoft.com/office/powerpoint/2010/main" val="4167474593"/>
       </p:ext>
     </p:extLst>
   </p:cSld>
@@ -3803,7 +4789,7 @@
           <p:cNvPr id="2" name="Title 1">
             <a:extLst>
               <a:ext uri="{FF2B5EF4-FFF2-40B4-BE49-F238E27FC236}">
-                <a16:creationId xmlns:a16="http://schemas.microsoft.com/office/drawing/2014/main" id="{6EFCD60A-26B6-4BD7-A91C-69C3590C123C}"/>
+                <a16:creationId xmlns:a16="http://schemas.microsoft.com/office/drawing/2014/main" id="{50B95908-D75C-4C64-8779-7111DB198EEF}"/>
               </a:ext>
             </a:extLst>
           </p:cNvPr>
@@ -3821,40 +4807,113 @@
           <a:p>
             <a:r>
               <a:rPr lang="en-US" dirty="0"/>
+              <a:t>Resource Allocation</a:t>
+            </a:r>
+          </a:p>
+        </p:txBody>
+      </p:sp>
+      <p:sp>
+        <p:nvSpPr>
+          <p:cNvPr id="3" name="Content Placeholder 2">
+            <a:extLst>
+              <a:ext uri="{FF2B5EF4-FFF2-40B4-BE49-F238E27FC236}">
+                <a16:creationId xmlns:a16="http://schemas.microsoft.com/office/drawing/2014/main" id="{ACB78887-10B6-469C-AEB2-EAA14509F8C0}"/>
+              </a:ext>
+            </a:extLst>
+          </p:cNvPr>
+          <p:cNvSpPr>
+            <a:spLocks noGrp="1"/>
+          </p:cNvSpPr>
+          <p:nvPr>
+            <p:ph idx="1"/>
+          </p:nvPr>
+        </p:nvSpPr>
+        <p:spPr/>
+        <p:txBody>
+          <a:bodyPr>
+            <a:normAutofit lnSpcReduction="10000"/>
+          </a:bodyPr>
+          <a:lstStyle/>
+          <a:p>
+            <a:r>
+              <a:rPr lang="en-US" dirty="0"/>
+              <a:t>Brian Hicks</a:t>
+            </a:r>
+          </a:p>
+          <a:p>
+            <a:pPr lvl="1"/>
+            <a:r>
+              <a:rPr lang="en-US" dirty="0"/>
+              <a:t>System Context Model</a:t>
+            </a:r>
+          </a:p>
+          <a:p>
+            <a:pPr lvl="1"/>
+            <a:r>
+              <a:rPr lang="en-US" dirty="0"/>
+              <a:t>CF09 Front and Back end development</a:t>
+            </a:r>
+          </a:p>
+          <a:p>
+            <a:pPr lvl="1"/>
+            <a:r>
+              <a:rPr lang="en-US" dirty="0"/>
+              <a:t>Material-UI Front End</a:t>
+            </a:r>
+          </a:p>
+          <a:p>
+            <a:r>
+              <a:rPr lang="en-US" dirty="0"/>
+              <a:t>Brian Snow</a:t>
+            </a:r>
+          </a:p>
+          <a:p>
+            <a:pPr lvl="1"/>
+            <a:r>
+              <a:rPr lang="en-US" dirty="0"/>
+              <a:t>User Authentication</a:t>
+            </a:r>
+          </a:p>
+          <a:p>
+            <a:r>
+              <a:rPr lang="en-US" dirty="0"/>
+              <a:t>Bob Caplin</a:t>
+            </a:r>
+          </a:p>
+          <a:p>
+            <a:pPr lvl="1"/>
+            <a:r>
+              <a:rPr lang="en-US" dirty="0"/>
+              <a:t>Story Map</a:t>
+            </a:r>
+          </a:p>
+          <a:p>
+            <a:pPr lvl="1"/>
+            <a:r>
+              <a:rPr lang="en-US" dirty="0"/>
               <a:t>Wireframes</a:t>
             </a:r>
           </a:p>
-        </p:txBody>
-      </p:sp>
-      <p:sp>
-        <p:nvSpPr>
-          <p:cNvPr id="3" name="Content Placeholder 2">
-            <a:extLst>
-              <a:ext uri="{FF2B5EF4-FFF2-40B4-BE49-F238E27FC236}">
-                <a16:creationId xmlns:a16="http://schemas.microsoft.com/office/drawing/2014/main" id="{0E3F524E-77D0-4821-A667-9C1276C5D80E}"/>
-              </a:ext>
-            </a:extLst>
-          </p:cNvPr>
-          <p:cNvSpPr>
-            <a:spLocks noGrp="1"/>
-          </p:cNvSpPr>
-          <p:nvPr>
-            <p:ph idx="1"/>
-          </p:nvPr>
-        </p:nvSpPr>
-        <p:spPr/>
-        <p:txBody>
-          <a:bodyPr/>
-          <a:lstStyle/>
-          <a:p>
-            <a:endParaRPr lang="en-US"/>
+          <a:p>
+            <a:pPr lvl="1"/>
+            <a:r>
+              <a:rPr lang="en-US" dirty="0"/>
+              <a:t>Presentation</a:t>
+            </a:r>
+          </a:p>
+          <a:p>
+            <a:pPr lvl="1"/>
+            <a:r>
+              <a:rPr lang="en-US" dirty="0"/>
+              <a:t>CF09 test case</a:t>
+            </a:r>
           </a:p>
         </p:txBody>
       </p:sp>
     </p:spTree>
     <p:extLst>
       <p:ext uri="{BB962C8B-B14F-4D97-AF65-F5344CB8AC3E}">
-        <p14:creationId xmlns:p14="http://schemas.microsoft.com/office/powerpoint/2010/main" val="804584963"/>
+        <p14:creationId xmlns:p14="http://schemas.microsoft.com/office/powerpoint/2010/main" val="2589486596"/>
       </p:ext>
     </p:extLst>
   </p:cSld>
@@ -3886,7 +4945,7 @@
           <p:cNvPr id="2" name="Title 1">
             <a:extLst>
               <a:ext uri="{FF2B5EF4-FFF2-40B4-BE49-F238E27FC236}">
-                <a16:creationId xmlns:a16="http://schemas.microsoft.com/office/drawing/2014/main" id="{A6E11F29-642E-40E8-B789-DFB647E7ADB3}"/>
+                <a16:creationId xmlns:a16="http://schemas.microsoft.com/office/drawing/2014/main" id="{6EFCD60A-26B6-4BD7-A91C-69C3590C123C}"/>
               </a:ext>
             </a:extLst>
           </p:cNvPr>
@@ -3904,40 +4963,45 @@
           <a:p>
             <a:r>
               <a:rPr lang="en-US" dirty="0"/>
-              <a:t>System Context Model</a:t>
-            </a:r>
-          </a:p>
-        </p:txBody>
-      </p:sp>
-      <p:sp>
-        <p:nvSpPr>
-          <p:cNvPr id="3" name="Content Placeholder 2">
-            <a:extLst>
-              <a:ext uri="{FF2B5EF4-FFF2-40B4-BE49-F238E27FC236}">
-                <a16:creationId xmlns:a16="http://schemas.microsoft.com/office/drawing/2014/main" id="{6C4C06F5-9A55-4268-9A56-A91C9293C9BB}"/>
-              </a:ext>
-            </a:extLst>
-          </p:cNvPr>
-          <p:cNvSpPr>
-            <a:spLocks noGrp="1"/>
-          </p:cNvSpPr>
-          <p:nvPr>
-            <p:ph idx="1"/>
-          </p:nvPr>
-        </p:nvSpPr>
-        <p:spPr/>
-        <p:txBody>
-          <a:bodyPr/>
-          <a:lstStyle/>
-          <a:p>
-            <a:endParaRPr lang="en-US"/>
-          </a:p>
-        </p:txBody>
-      </p:sp>
+              <a:t>Wireframes – User Authentication</a:t>
+            </a:r>
+          </a:p>
+        </p:txBody>
+      </p:sp>
+      <p:pic>
+        <p:nvPicPr>
+          <p:cNvPr id="6" name="Picture 5">
+            <a:extLst>
+              <a:ext uri="{FF2B5EF4-FFF2-40B4-BE49-F238E27FC236}">
+                <a16:creationId xmlns:a16="http://schemas.microsoft.com/office/drawing/2014/main" id="{B8480252-3B07-44CE-BFF9-5B74FE283FA0}"/>
+              </a:ext>
+            </a:extLst>
+          </p:cNvPr>
+          <p:cNvPicPr>
+            <a:picLocks noChangeAspect="1"/>
+          </p:cNvPicPr>
+          <p:nvPr/>
+        </p:nvPicPr>
+        <p:blipFill>
+          <a:blip r:embed="rId2"/>
+          <a:stretch>
+            <a:fillRect/>
+          </a:stretch>
+        </p:blipFill>
+        <p:spPr>
+          <a:xfrm>
+            <a:off x="838200" y="1335541"/>
+            <a:ext cx="6962775" cy="5362575"/>
+          </a:xfrm>
+          <a:prstGeom prst="rect">
+            <a:avLst/>
+          </a:prstGeom>
+        </p:spPr>
+      </p:pic>
     </p:spTree>
     <p:extLst>
       <p:ext uri="{BB962C8B-B14F-4D97-AF65-F5344CB8AC3E}">
-        <p14:creationId xmlns:p14="http://schemas.microsoft.com/office/powerpoint/2010/main" val="2192192540"/>
+        <p14:creationId xmlns:p14="http://schemas.microsoft.com/office/powerpoint/2010/main" val="804584963"/>
       </p:ext>
     </p:extLst>
   </p:cSld>
@@ -3969,7 +5033,7 @@
           <p:cNvPr id="2" name="Title 1">
             <a:extLst>
               <a:ext uri="{FF2B5EF4-FFF2-40B4-BE49-F238E27FC236}">
-                <a16:creationId xmlns:a16="http://schemas.microsoft.com/office/drawing/2014/main" id="{67679B60-390F-4985-89EA-BA2155A34027}"/>
+                <a16:creationId xmlns:a16="http://schemas.microsoft.com/office/drawing/2014/main" id="{78FDEEB7-C9E3-4CD4-AA19-2009F6EC2A3F}"/>
               </a:ext>
             </a:extLst>
           </p:cNvPr>
@@ -3987,46 +5051,137 @@
           <a:p>
             <a:r>
               <a:rPr lang="en-US" dirty="0"/>
-              <a:t>Materials Used (Sources)</a:t>
-            </a:r>
-          </a:p>
-        </p:txBody>
-      </p:sp>
-      <p:sp>
-        <p:nvSpPr>
-          <p:cNvPr id="3" name="Content Placeholder 2">
-            <a:extLst>
-              <a:ext uri="{FF2B5EF4-FFF2-40B4-BE49-F238E27FC236}">
-                <a16:creationId xmlns:a16="http://schemas.microsoft.com/office/drawing/2014/main" id="{6F3DDD06-568A-42C2-B6ED-3EE56767B3D7}"/>
-              </a:ext>
-            </a:extLst>
-          </p:cNvPr>
-          <p:cNvSpPr>
-            <a:spLocks noGrp="1"/>
-          </p:cNvSpPr>
-          <p:nvPr>
-            <p:ph idx="1"/>
-          </p:nvPr>
-        </p:nvSpPr>
-        <p:spPr/>
-        <p:txBody>
-          <a:bodyPr/>
-          <a:lstStyle/>
-          <a:p>
-            <a:pPr marL="0" indent="0">
-              <a:buNone/>
-            </a:pPr>
-            <a:r>
-              <a:rPr lang="en-US" dirty="0"/>
-              <a:t>(I think this is just our opportunity to declare any external code sources used to develop the site… like if we closely followed a tutorial, forum post, </a:t>
-            </a:r>
-            <a:r>
-              <a:rPr lang="en-US" dirty="0" err="1"/>
-              <a:t>etc</a:t>
-            </a:r>
-            <a:r>
-              <a:rPr lang="en-US" dirty="0"/>
-              <a:t>)</a:t>
+              <a:t>Wireframes – Student and Admin Main Pages</a:t>
+            </a:r>
+          </a:p>
+        </p:txBody>
+      </p:sp>
+      <p:pic>
+        <p:nvPicPr>
+          <p:cNvPr id="4" name="Picture 3">
+            <a:extLst>
+              <a:ext uri="{FF2B5EF4-FFF2-40B4-BE49-F238E27FC236}">
+                <a16:creationId xmlns:a16="http://schemas.microsoft.com/office/drawing/2014/main" id="{35D810DC-C708-4C58-99C6-FCCA33701D91}"/>
+              </a:ext>
+            </a:extLst>
+          </p:cNvPr>
+          <p:cNvPicPr>
+            <a:picLocks noChangeAspect="1"/>
+          </p:cNvPicPr>
+          <p:nvPr/>
+        </p:nvPicPr>
+        <p:blipFill>
+          <a:blip r:embed="rId2"/>
+          <a:stretch>
+            <a:fillRect/>
+          </a:stretch>
+        </p:blipFill>
+        <p:spPr>
+          <a:xfrm>
+            <a:off x="590550" y="1445662"/>
+            <a:ext cx="5505450" cy="4171950"/>
+          </a:xfrm>
+          <a:prstGeom prst="rect">
+            <a:avLst/>
+          </a:prstGeom>
+        </p:spPr>
+      </p:pic>
+      <p:pic>
+        <p:nvPicPr>
+          <p:cNvPr id="5" name="Picture 4">
+            <a:extLst>
+              <a:ext uri="{FF2B5EF4-FFF2-40B4-BE49-F238E27FC236}">
+                <a16:creationId xmlns:a16="http://schemas.microsoft.com/office/drawing/2014/main" id="{EEC79BD3-BA38-4135-A6AC-24EF10F51355}"/>
+              </a:ext>
+            </a:extLst>
+          </p:cNvPr>
+          <p:cNvPicPr>
+            <a:picLocks noChangeAspect="1"/>
+          </p:cNvPicPr>
+          <p:nvPr/>
+        </p:nvPicPr>
+        <p:blipFill>
+          <a:blip r:embed="rId3"/>
+          <a:stretch>
+            <a:fillRect/>
+          </a:stretch>
+        </p:blipFill>
+        <p:spPr>
+          <a:xfrm>
+            <a:off x="6238875" y="1493287"/>
+            <a:ext cx="5362575" cy="4124325"/>
+          </a:xfrm>
+          <a:prstGeom prst="rect">
+            <a:avLst/>
+          </a:prstGeom>
+        </p:spPr>
+      </p:pic>
+      <p:sp>
+        <p:nvSpPr>
+          <p:cNvPr id="6" name="TextBox 5">
+            <a:extLst>
+              <a:ext uri="{FF2B5EF4-FFF2-40B4-BE49-F238E27FC236}">
+                <a16:creationId xmlns:a16="http://schemas.microsoft.com/office/drawing/2014/main" id="{B3294C38-2D23-496B-8192-B122B33C66B6}"/>
+              </a:ext>
+            </a:extLst>
+          </p:cNvPr>
+          <p:cNvSpPr txBox="1"/>
+          <p:nvPr/>
+        </p:nvSpPr>
+        <p:spPr>
+          <a:xfrm>
+            <a:off x="767248" y="5690442"/>
+            <a:ext cx="5241666" cy="646331"/>
+          </a:xfrm>
+          <a:prstGeom prst="rect">
+            <a:avLst/>
+          </a:prstGeom>
+          <a:noFill/>
+        </p:spPr>
+        <p:txBody>
+          <a:bodyPr wrap="square" rtlCol="0">
+            <a:spAutoFit/>
+          </a:bodyPr>
+          <a:lstStyle/>
+          <a:p>
+            <a:r>
+              <a:rPr lang="en-US" dirty="0"/>
+              <a:t>Student Main Page: Displays Career Cluster links and allows User to interact with Chat Counselor.</a:t>
+            </a:r>
+          </a:p>
+        </p:txBody>
+      </p:sp>
+      <p:sp>
+        <p:nvSpPr>
+          <p:cNvPr id="7" name="TextBox 6">
+            <a:extLst>
+              <a:ext uri="{FF2B5EF4-FFF2-40B4-BE49-F238E27FC236}">
+                <a16:creationId xmlns:a16="http://schemas.microsoft.com/office/drawing/2014/main" id="{F4D8999F-EB34-449D-A769-8CF86D6BD2F9}"/>
+              </a:ext>
+            </a:extLst>
+          </p:cNvPr>
+          <p:cNvSpPr txBox="1"/>
+          <p:nvPr/>
+        </p:nvSpPr>
+        <p:spPr>
+          <a:xfrm>
+            <a:off x="6299329" y="5690442"/>
+            <a:ext cx="5241666" cy="646331"/>
+          </a:xfrm>
+          <a:prstGeom prst="rect">
+            <a:avLst/>
+          </a:prstGeom>
+          <a:noFill/>
+        </p:spPr>
+        <p:txBody>
+          <a:bodyPr wrap="square" rtlCol="0">
+            <a:spAutoFit/>
+          </a:bodyPr>
+          <a:lstStyle/>
+          <a:p>
+            <a:r>
+              <a:rPr lang="en-US" dirty="0"/>
+              <a:t>Admin Main Page: Career Cluster and Chat Counselor management. User Management.</a:t>
             </a:r>
           </a:p>
         </p:txBody>
@@ -4034,7 +5189,7 @@
     </p:spTree>
     <p:extLst>
       <p:ext uri="{BB962C8B-B14F-4D97-AF65-F5344CB8AC3E}">
-        <p14:creationId xmlns:p14="http://schemas.microsoft.com/office/powerpoint/2010/main" val="1029897165"/>
+        <p14:creationId xmlns:p14="http://schemas.microsoft.com/office/powerpoint/2010/main" val="4103134004"/>
       </p:ext>
     </p:extLst>
   </p:cSld>
@@ -4066,7 +5221,7 @@
           <p:cNvPr id="2" name="Title 1">
             <a:extLst>
               <a:ext uri="{FF2B5EF4-FFF2-40B4-BE49-F238E27FC236}">
-                <a16:creationId xmlns:a16="http://schemas.microsoft.com/office/drawing/2014/main" id="{00D7B7DD-6726-4E97-B33C-2FF9A3F83A2F}"/>
+                <a16:creationId xmlns:a16="http://schemas.microsoft.com/office/drawing/2014/main" id="{7F1C32DD-1EED-4A02-B7B6-59758454A47E}"/>
               </a:ext>
             </a:extLst>
           </p:cNvPr>
@@ -4084,67 +5239,313 @@
           <a:p>
             <a:r>
               <a:rPr lang="en-US" dirty="0"/>
-              <a:t>Career Finder Demo</a:t>
-            </a:r>
-          </a:p>
-        </p:txBody>
-      </p:sp>
-      <p:sp>
-        <p:nvSpPr>
-          <p:cNvPr id="3" name="Content Placeholder 2">
-            <a:extLst>
-              <a:ext uri="{FF2B5EF4-FFF2-40B4-BE49-F238E27FC236}">
-                <a16:creationId xmlns:a16="http://schemas.microsoft.com/office/drawing/2014/main" id="{0C77D4AA-5DDD-454E-8C53-889124C88CCE}"/>
-              </a:ext>
-            </a:extLst>
-          </p:cNvPr>
-          <p:cNvSpPr>
-            <a:spLocks noGrp="1"/>
-          </p:cNvSpPr>
-          <p:nvPr>
-            <p:ph idx="1"/>
-          </p:nvPr>
-        </p:nvSpPr>
-        <p:spPr/>
-        <p:txBody>
-          <a:bodyPr/>
-          <a:lstStyle/>
-          <a:p>
-            <a:r>
-              <a:rPr lang="en-US" dirty="0">
-                <a:hlinkClick r:id="rId2"/>
-              </a:rPr>
-              <a:t>https://nameless-gorge-50235.herokuapp.com/</a:t>
-            </a:r>
+              <a:t>Wireframes – User Management (Admin)</a:t>
+            </a:r>
+          </a:p>
+        </p:txBody>
+      </p:sp>
+      <p:pic>
+        <p:nvPicPr>
+          <p:cNvPr id="4" name="Picture 3">
+            <a:extLst>
+              <a:ext uri="{FF2B5EF4-FFF2-40B4-BE49-F238E27FC236}">
+                <a16:creationId xmlns:a16="http://schemas.microsoft.com/office/drawing/2014/main" id="{D58D4214-446C-47E0-A5F8-AE0780912A61}"/>
+              </a:ext>
+            </a:extLst>
+          </p:cNvPr>
+          <p:cNvPicPr>
+            <a:picLocks noChangeAspect="1"/>
+          </p:cNvPicPr>
+          <p:nvPr/>
+        </p:nvPicPr>
+        <p:blipFill>
+          <a:blip r:embed="rId2"/>
+          <a:stretch>
+            <a:fillRect/>
+          </a:stretch>
+        </p:blipFill>
+        <p:spPr>
+          <a:xfrm>
+            <a:off x="838200" y="1690688"/>
+            <a:ext cx="5343525" cy="4124325"/>
+          </a:xfrm>
+          <a:prstGeom prst="rect">
+            <a:avLst/>
+          </a:prstGeom>
+        </p:spPr>
+      </p:pic>
+      <p:sp>
+        <p:nvSpPr>
+          <p:cNvPr id="5" name="TextBox 4">
+            <a:extLst>
+              <a:ext uri="{FF2B5EF4-FFF2-40B4-BE49-F238E27FC236}">
+                <a16:creationId xmlns:a16="http://schemas.microsoft.com/office/drawing/2014/main" id="{E44F62B1-CCA3-4A0F-BF9C-8FF667C5F1B9}"/>
+              </a:ext>
+            </a:extLst>
+          </p:cNvPr>
+          <p:cNvSpPr txBox="1"/>
+          <p:nvPr/>
+        </p:nvSpPr>
+        <p:spPr>
+          <a:xfrm>
+            <a:off x="6870583" y="1690688"/>
+            <a:ext cx="4483217" cy="2585323"/>
+          </a:xfrm>
+          <a:prstGeom prst="rect">
+            <a:avLst/>
+          </a:prstGeom>
+          <a:noFill/>
+        </p:spPr>
+        <p:txBody>
+          <a:bodyPr wrap="square" rtlCol="0">
+            <a:spAutoFit/>
+          </a:bodyPr>
+          <a:lstStyle/>
+          <a:p>
+            <a:pPr marL="285750" indent="-285750">
+              <a:buFont typeface="Arial" panose="020B0604020202020204" pitchFamily="34" charset="0"/>
+              <a:buChar char="•"/>
+            </a:pPr>
+            <a:r>
+              <a:rPr lang="en-US" dirty="0"/>
+              <a:t>Create, Read, Update, Delete ‘Student’ and ‘Admin’ User types.</a:t>
+            </a:r>
+          </a:p>
+          <a:p>
+            <a:pPr marL="285750" indent="-285750">
+              <a:buFont typeface="Arial" panose="020B0604020202020204" pitchFamily="34" charset="0"/>
+              <a:buChar char="•"/>
+            </a:pPr>
             <a:endParaRPr lang="en-US" dirty="0"/>
           </a:p>
           <a:p>
+            <a:pPr marL="285750" indent="-285750">
+              <a:buFont typeface="Arial" panose="020B0604020202020204" pitchFamily="34" charset="0"/>
+              <a:buChar char="•"/>
+            </a:pPr>
+            <a:r>
+              <a:rPr lang="en-US" dirty="0"/>
+              <a:t>‘Student’ accounts track progress via points when ‘Rewards’ system enabled.</a:t>
+            </a:r>
+          </a:p>
+          <a:p>
+            <a:pPr marL="285750" indent="-285750">
+              <a:buFont typeface="Arial" panose="020B0604020202020204" pitchFamily="34" charset="0"/>
+              <a:buChar char="•"/>
+            </a:pPr>
             <a:endParaRPr lang="en-US" dirty="0"/>
           </a:p>
           <a:p>
+            <a:pPr marL="285750" indent="-285750">
+              <a:buFont typeface="Arial" panose="020B0604020202020204" pitchFamily="34" charset="0"/>
+              <a:buChar char="•"/>
+            </a:pPr>
+            <a:r>
+              <a:rPr lang="en-US" dirty="0"/>
+              <a:t>Users can be assigned to and filtered by ‘Class’.</a:t>
+            </a:r>
+          </a:p>
+          <a:p>
+            <a:pPr marL="285750" indent="-285750">
+              <a:buFont typeface="Arial" panose="020B0604020202020204" pitchFamily="34" charset="0"/>
+              <a:buChar char="•"/>
+            </a:pPr>
             <a:endParaRPr lang="en-US" dirty="0"/>
-          </a:p>
-          <a:p>
-            <a:r>
-              <a:rPr lang="en-US" dirty="0"/>
-              <a:t>Demonstration of current functionality.</a:t>
-            </a:r>
-          </a:p>
-          <a:p>
-            <a:endParaRPr lang="en-US" dirty="0"/>
-          </a:p>
-          <a:p>
-            <a:r>
-              <a:rPr lang="en-US" dirty="0"/>
-              <a:t>Questions?</a:t>
-            </a:r>
           </a:p>
         </p:txBody>
       </p:sp>
     </p:spTree>
     <p:extLst>
       <p:ext uri="{BB962C8B-B14F-4D97-AF65-F5344CB8AC3E}">
-        <p14:creationId xmlns:p14="http://schemas.microsoft.com/office/powerpoint/2010/main" val="1310432167"/>
+        <p14:creationId xmlns:p14="http://schemas.microsoft.com/office/powerpoint/2010/main" val="2853178110"/>
+      </p:ext>
+    </p:extLst>
+  </p:cSld>
+  <p:clrMapOvr>
+    <a:masterClrMapping/>
+  </p:clrMapOvr>
+</p:sld>
+</file>
+
+<file path=ppt/slides/slide9.xml><?xml version="1.0" encoding="utf-8"?>
+<p:sld xmlns:a="http://schemas.openxmlformats.org/drawingml/2006/main" xmlns:r="http://schemas.openxmlformats.org/officeDocument/2006/relationships" xmlns:p="http://schemas.openxmlformats.org/presentationml/2006/main">
+  <p:cSld>
+    <p:spTree>
+      <p:nvGrpSpPr>
+        <p:cNvPr id="1" name=""/>
+        <p:cNvGrpSpPr/>
+        <p:nvPr/>
+      </p:nvGrpSpPr>
+      <p:grpSpPr>
+        <a:xfrm>
+          <a:off x="0" y="0"/>
+          <a:ext cx="0" cy="0"/>
+          <a:chOff x="0" y="0"/>
+          <a:chExt cx="0" cy="0"/>
+        </a:xfrm>
+      </p:grpSpPr>
+      <p:sp>
+        <p:nvSpPr>
+          <p:cNvPr id="2" name="Title 1">
+            <a:extLst>
+              <a:ext uri="{FF2B5EF4-FFF2-40B4-BE49-F238E27FC236}">
+                <a16:creationId xmlns:a16="http://schemas.microsoft.com/office/drawing/2014/main" id="{BF017D1F-DC08-4F52-9E7D-49161A3F71A1}"/>
+              </a:ext>
+            </a:extLst>
+          </p:cNvPr>
+          <p:cNvSpPr>
+            <a:spLocks noGrp="1"/>
+          </p:cNvSpPr>
+          <p:nvPr>
+            <p:ph type="title"/>
+          </p:nvPr>
+        </p:nvSpPr>
+        <p:spPr/>
+        <p:txBody>
+          <a:bodyPr/>
+          <a:lstStyle/>
+          <a:p>
+            <a:r>
+              <a:rPr lang="en-US" dirty="0"/>
+              <a:t>Wireframes – Cluster Detail/ Career List Pages</a:t>
+            </a:r>
+          </a:p>
+        </p:txBody>
+      </p:sp>
+      <p:pic>
+        <p:nvPicPr>
+          <p:cNvPr id="4" name="Picture 3">
+            <a:extLst>
+              <a:ext uri="{FF2B5EF4-FFF2-40B4-BE49-F238E27FC236}">
+                <a16:creationId xmlns:a16="http://schemas.microsoft.com/office/drawing/2014/main" id="{EFF3130B-5ECD-4C7E-87C0-A17F74494ADD}"/>
+              </a:ext>
+            </a:extLst>
+          </p:cNvPr>
+          <p:cNvPicPr>
+            <a:picLocks noChangeAspect="1"/>
+          </p:cNvPicPr>
+          <p:nvPr/>
+        </p:nvPicPr>
+        <p:blipFill>
+          <a:blip r:embed="rId2"/>
+          <a:stretch>
+            <a:fillRect/>
+          </a:stretch>
+        </p:blipFill>
+        <p:spPr>
+          <a:xfrm>
+            <a:off x="545677" y="1690688"/>
+            <a:ext cx="5362575" cy="4095750"/>
+          </a:xfrm>
+          <a:prstGeom prst="rect">
+            <a:avLst/>
+          </a:prstGeom>
+        </p:spPr>
+      </p:pic>
+      <p:pic>
+        <p:nvPicPr>
+          <p:cNvPr id="5" name="Picture 4">
+            <a:extLst>
+              <a:ext uri="{FF2B5EF4-FFF2-40B4-BE49-F238E27FC236}">
+                <a16:creationId xmlns:a16="http://schemas.microsoft.com/office/drawing/2014/main" id="{CCA1A017-796C-44D9-BFC9-3AE90BADE97A}"/>
+              </a:ext>
+            </a:extLst>
+          </p:cNvPr>
+          <p:cNvPicPr>
+            <a:picLocks noChangeAspect="1"/>
+          </p:cNvPicPr>
+          <p:nvPr/>
+        </p:nvPicPr>
+        <p:blipFill>
+          <a:blip r:embed="rId3"/>
+          <a:stretch>
+            <a:fillRect/>
+          </a:stretch>
+        </p:blipFill>
+        <p:spPr>
+          <a:xfrm>
+            <a:off x="6283750" y="1690688"/>
+            <a:ext cx="5362575" cy="4114800"/>
+          </a:xfrm>
+          <a:prstGeom prst="rect">
+            <a:avLst/>
+          </a:prstGeom>
+        </p:spPr>
+      </p:pic>
+      <p:sp>
+        <p:nvSpPr>
+          <p:cNvPr id="6" name="TextBox 5">
+            <a:extLst>
+              <a:ext uri="{FF2B5EF4-FFF2-40B4-BE49-F238E27FC236}">
+                <a16:creationId xmlns:a16="http://schemas.microsoft.com/office/drawing/2014/main" id="{C499164F-263E-4369-A6B6-FF79515E9608}"/>
+              </a:ext>
+            </a:extLst>
+          </p:cNvPr>
+          <p:cNvSpPr txBox="1"/>
+          <p:nvPr/>
+        </p:nvSpPr>
+        <p:spPr>
+          <a:xfrm>
+            <a:off x="584628" y="5905850"/>
+            <a:ext cx="5254110" cy="646331"/>
+          </a:xfrm>
+          <a:prstGeom prst="rect">
+            <a:avLst/>
+          </a:prstGeom>
+          <a:noFill/>
+        </p:spPr>
+        <p:txBody>
+          <a:bodyPr wrap="square" rtlCol="0">
+            <a:spAutoFit/>
+          </a:bodyPr>
+          <a:lstStyle/>
+          <a:p>
+            <a:r>
+              <a:rPr lang="en-US" dirty="0"/>
+              <a:t>Student – Drilling down into cluster displays links for associated careers.</a:t>
+            </a:r>
+          </a:p>
+        </p:txBody>
+      </p:sp>
+      <p:sp>
+        <p:nvSpPr>
+          <p:cNvPr id="7" name="TextBox 6">
+            <a:extLst>
+              <a:ext uri="{FF2B5EF4-FFF2-40B4-BE49-F238E27FC236}">
+                <a16:creationId xmlns:a16="http://schemas.microsoft.com/office/drawing/2014/main" id="{5B8CD612-11C0-4222-99D3-33335A96114B}"/>
+              </a:ext>
+            </a:extLst>
+          </p:cNvPr>
+          <p:cNvSpPr txBox="1"/>
+          <p:nvPr/>
+        </p:nvSpPr>
+        <p:spPr>
+          <a:xfrm>
+            <a:off x="6283750" y="5905850"/>
+            <a:ext cx="5254110" cy="646331"/>
+          </a:xfrm>
+          <a:prstGeom prst="rect">
+            <a:avLst/>
+          </a:prstGeom>
+          <a:noFill/>
+        </p:spPr>
+        <p:txBody>
+          <a:bodyPr wrap="square" rtlCol="0">
+            <a:spAutoFit/>
+          </a:bodyPr>
+          <a:lstStyle/>
+          <a:p>
+            <a:r>
+              <a:rPr lang="en-US" dirty="0"/>
+              <a:t>Admin – Drilling down into cluster allows it to be edited and associated to keywords, careers.</a:t>
+            </a:r>
+          </a:p>
+        </p:txBody>
+      </p:sp>
+    </p:spTree>
+    <p:extLst>
+      <p:ext uri="{BB962C8B-B14F-4D97-AF65-F5344CB8AC3E}">
+        <p14:creationId xmlns:p14="http://schemas.microsoft.com/office/powerpoint/2010/main" val="74895039"/>
       </p:ext>
     </p:extLst>
   </p:cSld>

</xml_diff>

<commit_message>
Final Sprint1 Presentation Draft
</commit_message>
<xml_diff>
--- a/docs/sprint1Presentation.pptx
+++ b/docs/sprint1Presentation.pptx
@@ -273,7 +273,7 @@
           <a:p>
             <a:fld id="{1FFBDEF7-6A33-4033-91F9-9A847E381311}" type="datetimeFigureOut">
               <a:rPr lang="en-US" smtClean="0"/>
-              <a:t>3/13/2020</a:t>
+              <a:t>3/14/2020</a:t>
             </a:fld>
             <a:endParaRPr lang="en-US"/>
           </a:p>
@@ -471,7 +471,7 @@
           <a:p>
             <a:fld id="{1FFBDEF7-6A33-4033-91F9-9A847E381311}" type="datetimeFigureOut">
               <a:rPr lang="en-US" smtClean="0"/>
-              <a:t>3/13/2020</a:t>
+              <a:t>3/14/2020</a:t>
             </a:fld>
             <a:endParaRPr lang="en-US"/>
           </a:p>
@@ -679,7 +679,7 @@
           <a:p>
             <a:fld id="{1FFBDEF7-6A33-4033-91F9-9A847E381311}" type="datetimeFigureOut">
               <a:rPr lang="en-US" smtClean="0"/>
-              <a:t>3/13/2020</a:t>
+              <a:t>3/14/2020</a:t>
             </a:fld>
             <a:endParaRPr lang="en-US"/>
           </a:p>
@@ -877,7 +877,7 @@
           <a:p>
             <a:fld id="{1FFBDEF7-6A33-4033-91F9-9A847E381311}" type="datetimeFigureOut">
               <a:rPr lang="en-US" smtClean="0"/>
-              <a:t>3/13/2020</a:t>
+              <a:t>3/14/2020</a:t>
             </a:fld>
             <a:endParaRPr lang="en-US"/>
           </a:p>
@@ -1152,7 +1152,7 @@
           <a:p>
             <a:fld id="{1FFBDEF7-6A33-4033-91F9-9A847E381311}" type="datetimeFigureOut">
               <a:rPr lang="en-US" smtClean="0"/>
-              <a:t>3/13/2020</a:t>
+              <a:t>3/14/2020</a:t>
             </a:fld>
             <a:endParaRPr lang="en-US"/>
           </a:p>
@@ -1417,7 +1417,7 @@
           <a:p>
             <a:fld id="{1FFBDEF7-6A33-4033-91F9-9A847E381311}" type="datetimeFigureOut">
               <a:rPr lang="en-US" smtClean="0"/>
-              <a:t>3/13/2020</a:t>
+              <a:t>3/14/2020</a:t>
             </a:fld>
             <a:endParaRPr lang="en-US"/>
           </a:p>
@@ -1829,7 +1829,7 @@
           <a:p>
             <a:fld id="{1FFBDEF7-6A33-4033-91F9-9A847E381311}" type="datetimeFigureOut">
               <a:rPr lang="en-US" smtClean="0"/>
-              <a:t>3/13/2020</a:t>
+              <a:t>3/14/2020</a:t>
             </a:fld>
             <a:endParaRPr lang="en-US"/>
           </a:p>
@@ -1970,7 +1970,7 @@
           <a:p>
             <a:fld id="{1FFBDEF7-6A33-4033-91F9-9A847E381311}" type="datetimeFigureOut">
               <a:rPr lang="en-US" smtClean="0"/>
-              <a:t>3/13/2020</a:t>
+              <a:t>3/14/2020</a:t>
             </a:fld>
             <a:endParaRPr lang="en-US"/>
           </a:p>
@@ -2083,7 +2083,7 @@
           <a:p>
             <a:fld id="{1FFBDEF7-6A33-4033-91F9-9A847E381311}" type="datetimeFigureOut">
               <a:rPr lang="en-US" smtClean="0"/>
-              <a:t>3/13/2020</a:t>
+              <a:t>3/14/2020</a:t>
             </a:fld>
             <a:endParaRPr lang="en-US"/>
           </a:p>
@@ -2394,7 +2394,7 @@
           <a:p>
             <a:fld id="{1FFBDEF7-6A33-4033-91F9-9A847E381311}" type="datetimeFigureOut">
               <a:rPr lang="en-US" smtClean="0"/>
-              <a:t>3/13/2020</a:t>
+              <a:t>3/14/2020</a:t>
             </a:fld>
             <a:endParaRPr lang="en-US"/>
           </a:p>
@@ -2682,7 +2682,7 @@
           <a:p>
             <a:fld id="{1FFBDEF7-6A33-4033-91F9-9A847E381311}" type="datetimeFigureOut">
               <a:rPr lang="en-US" smtClean="0"/>
-              <a:t>3/13/2020</a:t>
+              <a:t>3/14/2020</a:t>
             </a:fld>
             <a:endParaRPr lang="en-US"/>
           </a:p>
@@ -2923,7 +2923,7 @@
           <a:p>
             <a:fld id="{1FFBDEF7-6A33-4033-91F9-9A847E381311}" type="datetimeFigureOut">
               <a:rPr lang="en-US" smtClean="0"/>
-              <a:t>3/13/2020</a:t>
+              <a:t>3/14/2020</a:t>
             </a:fld>
             <a:endParaRPr lang="en-US"/>
           </a:p>
@@ -4158,15 +4158,7 @@
             </a:pPr>
             <a:r>
               <a:rPr lang="en-US" dirty="0"/>
-              <a:t>(I think this is just our opportunity to declare any external code sources used to develop the site… like if we closely followed a tutorial, forum post, </a:t>
-            </a:r>
-            <a:r>
-              <a:rPr lang="en-US" dirty="0" err="1"/>
-              <a:t>etc</a:t>
-            </a:r>
-            <a:r>
-              <a:rPr lang="en-US" dirty="0"/>
-              <a:t>)</a:t>
+              <a:t>CEN3031Online Bootcamps and associated materials</a:t>
             </a:r>
           </a:p>
         </p:txBody>

</xml_diff>

<commit_message>
Final version of presentation used in demo.
</commit_message>
<xml_diff>
--- a/docs/sprint1Presentation.pptx
+++ b/docs/sprint1Presentation.pptx
@@ -4046,10 +4046,10 @@
       </p:sp>
       <p:pic>
         <p:nvPicPr>
-          <p:cNvPr id="4" name="Picture 3">
-            <a:extLst>
-              <a:ext uri="{FF2B5EF4-FFF2-40B4-BE49-F238E27FC236}">
-                <a16:creationId xmlns:a16="http://schemas.microsoft.com/office/drawing/2014/main" id="{6E498A19-2556-42D4-B829-547085C9B054}"/>
+          <p:cNvPr id="5" name="Picture 4" descr="A screenshot of a social media post&#10;&#10;Description automatically generated">
+            <a:extLst>
+              <a:ext uri="{FF2B5EF4-FFF2-40B4-BE49-F238E27FC236}">
+                <a16:creationId xmlns:a16="http://schemas.microsoft.com/office/drawing/2014/main" id="{8597AF03-4D86-403D-B04A-36F9BA7BC375}"/>
               </a:ext>
             </a:extLst>
           </p:cNvPr>
@@ -4059,15 +4059,21 @@
           <p:nvPr/>
         </p:nvPicPr>
         <p:blipFill>
-          <a:blip r:embed="rId2"/>
+          <a:blip r:embed="rId2">
+            <a:extLst>
+              <a:ext uri="{28A0092B-C50C-407E-A947-70E740481C1C}">
+                <a14:useLocalDpi xmlns:a14="http://schemas.microsoft.com/office/drawing/2010/main" val="0"/>
+              </a:ext>
+            </a:extLst>
+          </a:blip>
           <a:stretch>
             <a:fillRect/>
           </a:stretch>
         </p:blipFill>
         <p:spPr>
           <a:xfrm>
-            <a:off x="1490662" y="1738312"/>
-            <a:ext cx="9210675" cy="3381375"/>
+            <a:off x="1066630" y="1257226"/>
+            <a:ext cx="10058740" cy="4343547"/>
           </a:xfrm>
           <a:prstGeom prst="rect">
             <a:avLst/>
@@ -4158,7 +4164,7 @@
             </a:pPr>
             <a:r>
               <a:rPr lang="en-US" dirty="0"/>
-              <a:t>CEN3031Online Bootcamps and associated materials</a:t>
+              <a:t>CEN3031-Online Bootcamps and associated materials</a:t>
             </a:r>
           </a:p>
         </p:txBody>

</xml_diff>